<commit_message>
Some additions to introduction lecture
</commit_message>
<xml_diff>
--- a/Introduction to TouchDesigner/Introduction to TouchDesigner.pptx
+++ b/Introduction to TouchDesigner/Introduction to TouchDesigner.pptx
@@ -106,6 +106,11 @@
       </a:defRPr>
     </a:lvl9pPr>
   </p:defaultTextStyle>
+  <p:extLst>
+    <p:ext uri="{EFAFB233-063F-42B5-8137-9DF3F51BA10A}">
+      <p15:sldGuideLst xmlns:p15="http://schemas.microsoft.com/office/powerpoint/2012/main"/>
+    </p:ext>
+  </p:extLst>
 </p:presentation>
 </file>
 
@@ -3488,35 +3493,180 @@
             <p:ph idx="1"/>
           </p:nvPr>
         </p:nvSpPr>
-        <p:spPr/>
-        <p:txBody>
-          <a:bodyPr/>
-          <a:lstStyle/>
-          <a:p>
+        <p:spPr>
+          <a:xfrm>
+            <a:off x="494270" y="1825625"/>
+            <a:ext cx="10859530" cy="4351338"/>
+          </a:xfrm>
+        </p:spPr>
+        <p:txBody>
+          <a:bodyPr>
+            <a:normAutofit fontScale="55000" lnSpcReduction="20000"/>
+          </a:bodyPr>
+          <a:lstStyle/>
+          <a:p>
+            <a:r>
+              <a:rPr lang="en-GB" dirty="0"/>
+              <a:t>Getting started with </a:t>
+            </a:r>
+            <a:r>
+              <a:rPr lang="en-GB" dirty="0" err="1"/>
+              <a:t>TouchDesigner</a:t>
+            </a:r>
+            <a:endParaRPr lang="en-GB" dirty="0"/>
+          </a:p>
+          <a:p>
+            <a:pPr lvl="1"/>
             <a:r>
               <a:rPr lang="en-GB" dirty="0">
                 <a:hlinkClick r:id="rId2"/>
               </a:rPr>
-              <a:t>https://</a:t>
-            </a:r>
-            <a:r>
-              <a:rPr lang="en-GB" dirty="0" err="1">
-                <a:hlinkClick r:id="rId2"/>
+              <a:t>https://derivative.ca/UserGuide/Getting_Started_With_TouchDesigner</a:t>
+            </a:r>
+            <a:endParaRPr lang="en-GB" dirty="0"/>
+          </a:p>
+          <a:p>
+            <a:r>
+              <a:rPr lang="en-GB" dirty="0"/>
+              <a:t>First things to know about </a:t>
+            </a:r>
+            <a:r>
+              <a:rPr lang="en-GB" dirty="0" err="1"/>
+              <a:t>TouchDesigner</a:t>
+            </a:r>
+            <a:endParaRPr lang="en-GB" dirty="0"/>
+          </a:p>
+          <a:p>
+            <a:pPr lvl="1"/>
+            <a:r>
+              <a:rPr lang="en-GB" dirty="0">
+                <a:hlinkClick r:id="rId3"/>
               </a:rPr>
-              <a:t>docs.derivative.ca</a:t>
-            </a:r>
+              <a:t>https://derivative.ca/UserGuide/First_Things_to_Know_about_TouchDesigner</a:t>
+            </a:r>
+            <a:endParaRPr lang="en-GB" dirty="0"/>
+          </a:p>
+          <a:p>
+            <a:r>
+              <a:rPr lang="en-GB" dirty="0"/>
+              <a:t>Learning </a:t>
+            </a:r>
+            <a:r>
+              <a:rPr lang="en-GB" dirty="0" err="1"/>
+              <a:t>TouchDesigner</a:t>
+            </a:r>
+            <a:endParaRPr lang="en-GB" dirty="0"/>
+          </a:p>
+          <a:p>
+            <a:pPr lvl="1"/>
             <a:r>
               <a:rPr lang="en-GB" dirty="0">
-                <a:hlinkClick r:id="rId2"/>
+                <a:hlinkClick r:id="rId4"/>
               </a:rPr>
-              <a:t>/</a:t>
-            </a:r>
-            <a:r>
-              <a:rPr lang="en-GB" dirty="0" err="1">
-                <a:hlinkClick r:id="rId2"/>
+              <a:t>https://derivative.ca/UserGuide/Learning_TouchDesigner</a:t>
+            </a:r>
+            <a:endParaRPr lang="en-GB" dirty="0"/>
+          </a:p>
+          <a:p>
+            <a:r>
+              <a:rPr lang="en-GB" dirty="0"/>
+              <a:t>User guide</a:t>
+            </a:r>
+          </a:p>
+          <a:p>
+            <a:pPr lvl="1"/>
+            <a:r>
+              <a:rPr lang="en-GB" dirty="0">
+                <a:hlinkClick r:id="rId5"/>
               </a:rPr>
-              <a:t>Main_Page</a:t>
-            </a:r>
+              <a:t>https://derivative.ca/UserGuide/Main_Page</a:t>
+            </a:r>
+            <a:endParaRPr lang="en-GB" dirty="0"/>
+          </a:p>
+          <a:p>
+            <a:r>
+              <a:rPr lang="en-GB" dirty="0"/>
+              <a:t>User guide in WIKI format</a:t>
+            </a:r>
+          </a:p>
+          <a:p>
+            <a:pPr lvl="1"/>
+            <a:r>
+              <a:rPr lang="en-GB" dirty="0">
+                <a:hlinkClick r:id="rId6"/>
+              </a:rPr>
+              <a:t>https://docs.derivative.ca/Main_Page</a:t>
+            </a:r>
+            <a:endParaRPr lang="en-GB" dirty="0"/>
+          </a:p>
+          <a:p>
+            <a:r>
+              <a:rPr lang="en-GB" dirty="0"/>
+              <a:t>Scripting </a:t>
+            </a:r>
+            <a:r>
+              <a:rPr lang="en-GB" dirty="0" err="1"/>
+              <a:t>TouchDesigner</a:t>
+            </a:r>
+            <a:r>
+              <a:rPr lang="en-GB" dirty="0"/>
+              <a:t> with Python</a:t>
+            </a:r>
+          </a:p>
+          <a:p>
+            <a:pPr lvl="1"/>
+            <a:r>
+              <a:rPr lang="en-GB" dirty="0">
+                <a:hlinkClick r:id="rId7"/>
+              </a:rPr>
+              <a:t>https://docs.derivative.ca/Category:Python</a:t>
+            </a:r>
+            <a:endParaRPr lang="en-GB" dirty="0"/>
+          </a:p>
+          <a:p>
+            <a:r>
+              <a:rPr lang="en-GB" dirty="0"/>
+              <a:t>Download page</a:t>
+            </a:r>
+          </a:p>
+          <a:p>
+            <a:pPr lvl="1"/>
+            <a:r>
+              <a:rPr lang="en-GB" dirty="0">
+                <a:hlinkClick r:id="rId8"/>
+              </a:rPr>
+              <a:t>https://derivative.ca/download</a:t>
+            </a:r>
+            <a:endParaRPr lang="en-GB" dirty="0"/>
+          </a:p>
+          <a:p>
+            <a:pPr lvl="2"/>
+            <a:r>
+              <a:rPr lang="en-GB" dirty="0"/>
+              <a:t>I’ll be using the non-commercial version</a:t>
+            </a:r>
+          </a:p>
+          <a:p>
+            <a:r>
+              <a:rPr lang="en-GB" dirty="0" err="1"/>
+              <a:t>TouchDesigner</a:t>
+            </a:r>
+            <a:r>
+              <a:rPr lang="en-GB" dirty="0"/>
+              <a:t> glossary</a:t>
+            </a:r>
+          </a:p>
+          <a:p>
+            <a:pPr lvl="1"/>
+            <a:r>
+              <a:rPr lang="en-GB" dirty="0">
+                <a:hlinkClick r:id="rId9"/>
+              </a:rPr>
+              <a:t>https://derivative.ca/UserGuide/TouchDesigner_Glossary</a:t>
+            </a:r>
+            <a:endParaRPr lang="en-GB" dirty="0"/>
+          </a:p>
+          <a:p>
             <a:endParaRPr lang="en-GB" dirty="0"/>
           </a:p>
           <a:p>

</xml_diff>